<commit_message>
Update : done basic layout ppt updated
</commit_message>
<xml_diff>
--- a/Android Final Project.pptx
+++ b/Android Final Project.pptx
@@ -5,10 +5,10 @@
     <p:sldMasterId id="2147483660" r:id="rId1"/>
   </p:sldMasterIdLst>
   <p:notesMasterIdLst>
-    <p:notesMasterId r:id="rId8"/>
+    <p:notesMasterId r:id="rId7"/>
   </p:notesMasterIdLst>
   <p:handoutMasterIdLst>
-    <p:handoutMasterId r:id="rId9"/>
+    <p:handoutMasterId r:id="rId8"/>
   </p:handoutMasterIdLst>
   <p:sldIdLst>
     <p:sldId id="264" r:id="rId2"/>
@@ -16,7 +16,6 @@
     <p:sldId id="281" r:id="rId4"/>
     <p:sldId id="279" r:id="rId5"/>
     <p:sldId id="278" r:id="rId6"/>
-    <p:sldId id="268" r:id="rId7"/>
   </p:sldIdLst>
   <p:sldSz cx="12188825" cy="6858000"/>
   <p:notesSz cx="6858000" cy="9144000"/>
@@ -238,7 +237,7 @@
                   <a:schemeClr val="tx2"/>
                 </a:solidFill>
               </a:rPr>
-              <a:t>5/27/2020</a:t>
+              <a:t>6/3/2020</a:t>
             </a:fld>
             <a:endParaRPr dirty="0">
               <a:solidFill>
@@ -428,7 +427,7 @@
             <a:fld id="{F95CF31C-F757-429C-A789-86504F04C3BE}" type="datetimeFigureOut">
               <a:rPr lang="en-US"/>
               <a:pPr/>
-              <a:t>5/27/2020</a:t>
+              <a:t>6/3/2020</a:t>
             </a:fld>
             <a:endParaRPr dirty="0"/>
           </a:p>
@@ -1028,7 +1027,7 @@
           <a:p>
             <a:fld id="{7AECB6C2-1084-4AED-A74A-DF028B0094EA}" type="datetimeFigureOut">
               <a:rPr lang="en-US"/>
-              <a:t>5/27/2020</a:t>
+              <a:t>6/3/2020</a:t>
             </a:fld>
             <a:endParaRPr dirty="0"/>
           </a:p>
@@ -1220,7 +1219,7 @@
           <a:p>
             <a:fld id="{7AECB6C2-1084-4AED-A74A-DF028B0094EA}" type="datetimeFigureOut">
               <a:rPr lang="en-US"/>
-              <a:t>5/27/2020</a:t>
+              <a:t>6/3/2020</a:t>
             </a:fld>
             <a:endParaRPr dirty="0"/>
           </a:p>
@@ -1418,7 +1417,7 @@
           <a:p>
             <a:fld id="{8B5A30F4-0B4E-4E4B-BC36-C30CD13F4E17}" type="datetimeFigureOut">
               <a:rPr lang="en-US"/>
-              <a:t>5/27/2020</a:t>
+              <a:t>6/3/2020</a:t>
             </a:fld>
             <a:endParaRPr dirty="0"/>
           </a:p>
@@ -1935,7 +1934,7 @@
           <a:p>
             <a:fld id="{2DD204D1-F9BD-4643-8480-6EA41EB484F1}" type="datetimeFigureOut">
               <a:rPr lang="en-US"/>
-              <a:t>5/27/2020</a:t>
+              <a:t>6/3/2020</a:t>
             </a:fld>
             <a:endParaRPr dirty="0"/>
           </a:p>
@@ -2383,7 +2382,7 @@
           <a:p>
             <a:fld id="{2DD204D1-F9BD-4643-8480-6EA41EB484F1}" type="datetimeFigureOut">
               <a:rPr lang="en-US"/>
-              <a:t>5/27/2020</a:t>
+              <a:t>6/3/2020</a:t>
             </a:fld>
             <a:endParaRPr dirty="0"/>
           </a:p>
@@ -2513,7 +2512,7 @@
           <a:p>
             <a:fld id="{2DD204D1-F9BD-4643-8480-6EA41EB484F1}" type="datetimeFigureOut">
               <a:rPr lang="en-US"/>
-              <a:t>5/27/2020</a:t>
+              <a:t>6/3/2020</a:t>
             </a:fld>
             <a:endParaRPr dirty="0"/>
           </a:p>
@@ -2620,7 +2619,7 @@
           <a:p>
             <a:fld id="{2DD204D1-F9BD-4643-8480-6EA41EB484F1}" type="datetimeFigureOut">
               <a:rPr lang="en-US"/>
-              <a:t>5/27/2020</a:t>
+              <a:t>6/3/2020</a:t>
             </a:fld>
             <a:endParaRPr dirty="0"/>
           </a:p>
@@ -2977,7 +2976,7 @@
           <a:p>
             <a:fld id="{126BF754-515F-40B9-8D24-D54D5825B3D0}" type="datetimeFigureOut">
               <a:rPr lang="en-US"/>
-              <a:t>5/27/2020</a:t>
+              <a:t>6/3/2020</a:t>
             </a:fld>
             <a:endParaRPr dirty="0"/>
           </a:p>
@@ -3314,7 +3313,7 @@
           <a:p>
             <a:fld id="{126BF754-515F-40B9-8D24-D54D5825B3D0}" type="datetimeFigureOut">
               <a:rPr lang="en-US"/>
-              <a:t>5/27/2020</a:t>
+              <a:t>6/3/2020</a:t>
             </a:fld>
             <a:endParaRPr dirty="0"/>
           </a:p>
@@ -3609,7 +3608,7 @@
             <a:fld id="{2DD204D1-F9BD-4643-8480-6EA41EB484F1}" type="datetimeFigureOut">
               <a:rPr lang="en-US" smtClean="0"/>
               <a:pPr/>
-              <a:t>5/27/2020</a:t>
+              <a:t>6/3/2020</a:t>
             </a:fld>
             <a:endParaRPr lang="en-US" dirty="0"/>
           </a:p>
@@ -4244,12 +4243,6 @@
               <a:rPr lang="en-US" dirty="0" smtClean="0"/>
               <a:t>Interface</a:t>
             </a:r>
-          </a:p>
-          <a:p>
-            <a:r>
-              <a:rPr lang="en-US" dirty="0"/>
-              <a:t>Members 'contribution</a:t>
-            </a:r>
             <a:endParaRPr lang="en-US" dirty="0"/>
           </a:p>
         </p:txBody>
@@ -4329,12 +4322,323 @@
             <p:ph idx="1"/>
           </p:nvPr>
         </p:nvSpPr>
-        <p:spPr/>
-        <p:txBody>
-          <a:bodyPr/>
+        <p:spPr>
+          <a:xfrm>
+            <a:off x="1117309" y="1701800"/>
+            <a:ext cx="10157354" cy="1193800"/>
+          </a:xfrm>
+        </p:spPr>
+        <p:txBody>
+          <a:bodyPr>
+            <a:normAutofit/>
+          </a:bodyPr>
           <a:lstStyle/>
           <a:p>
+            <a:pPr marL="0" indent="0">
+              <a:buNone/>
+            </a:pPr>
+            <a:r>
+              <a:rPr lang="en-US" sz="1800" dirty="0"/>
+              <a:t>The Free Calculator simplifies your life </a:t>
+            </a:r>
+            <a:r>
+              <a:rPr lang="en-US" sz="1800" dirty="0" smtClean="0"/>
+              <a:t>and multiplies </a:t>
+            </a:r>
+            <a:r>
+              <a:rPr lang="en-US" sz="1800" dirty="0"/>
+              <a:t>your </a:t>
+            </a:r>
+            <a:r>
+              <a:rPr lang="en-US" sz="1800" dirty="0" smtClean="0"/>
+              <a:t>opportunities. For </a:t>
+            </a:r>
+            <a:r>
+              <a:rPr lang="en-US" sz="1800" dirty="0"/>
+              <a:t>work &amp; school at home. A basic </a:t>
+            </a:r>
+            <a:r>
+              <a:rPr lang="en-US" sz="1800" dirty="0" smtClean="0"/>
+              <a:t>calculator and </a:t>
+            </a:r>
+            <a:r>
+              <a:rPr lang="en-US" sz="1800" dirty="0"/>
+              <a:t>a scientific mode for more extensive </a:t>
+            </a:r>
+            <a:r>
+              <a:rPr lang="en-US" sz="1800" dirty="0" smtClean="0"/>
+              <a:t>math. The </a:t>
+            </a:r>
+            <a:r>
+              <a:rPr lang="en-US" sz="1800" dirty="0"/>
+              <a:t>Free Calculator simplifies your life </a:t>
+            </a:r>
+            <a:r>
+              <a:rPr lang="en-US" sz="1800" dirty="0" smtClean="0"/>
+              <a:t>and multiplies </a:t>
+            </a:r>
+            <a:r>
+              <a:rPr lang="en-US" sz="1800" dirty="0"/>
+              <a:t>your opportunities!</a:t>
+            </a:r>
+            <a:endParaRPr lang="en-US" sz="1800" dirty="0"/>
+          </a:p>
+        </p:txBody>
+      </p:sp>
+      <p:sp>
+        <p:nvSpPr>
+          <p:cNvPr id="6" name="Title 1"/>
+          <p:cNvSpPr txBox="1">
+            <a:spLocks/>
+          </p:cNvSpPr>
+          <p:nvPr/>
+        </p:nvSpPr>
+        <p:spPr>
+          <a:xfrm>
+            <a:off x="1117309" y="2743200"/>
+            <a:ext cx="10157354" cy="1397000"/>
+          </a:xfrm>
+          <a:prstGeom prst="rect">
+            <a:avLst/>
+          </a:prstGeom>
+        </p:spPr>
+        <p:txBody>
+          <a:bodyPr vert="horz" lIns="121899" tIns="60949" rIns="121899" bIns="60949" rtlCol="0" anchor="b">
+            <a:normAutofit/>
+          </a:bodyPr>
+          <a:lstStyle>
+            <a:lvl1pPr algn="l" defTabSz="1218987" rtl="0" eaLnBrk="1" latinLnBrk="0" hangingPunct="1">
+              <a:lnSpc>
+                <a:spcPct val="85000"/>
+              </a:lnSpc>
+              <a:spcBef>
+                <a:spcPct val="0"/>
+              </a:spcBef>
+              <a:buNone/>
+              <a:tabLst/>
+              <a:defRPr sz="4400" kern="1200" cap="none" baseline="0">
+                <a:solidFill>
+                  <a:schemeClr val="tx1"/>
+                </a:solidFill>
+                <a:latin typeface="+mj-lt"/>
+                <a:ea typeface="+mj-ea"/>
+                <a:cs typeface="+mj-cs"/>
+              </a:defRPr>
+            </a:lvl1pPr>
+          </a:lstStyle>
+          <a:p>
+            <a:r>
+              <a:rPr lang="en-US" smtClean="0"/>
+              <a:t>Feature</a:t>
+            </a:r>
             <a:endParaRPr lang="en-US" dirty="0"/>
+          </a:p>
+        </p:txBody>
+      </p:sp>
+      <p:sp>
+        <p:nvSpPr>
+          <p:cNvPr id="7" name="Content Placeholder 3"/>
+          <p:cNvSpPr txBox="1">
+            <a:spLocks/>
+          </p:cNvSpPr>
+          <p:nvPr/>
+        </p:nvSpPr>
+        <p:spPr>
+          <a:xfrm>
+            <a:off x="1117309" y="4368800"/>
+            <a:ext cx="10157354" cy="912535"/>
+          </a:xfrm>
+          <a:prstGeom prst="rect">
+            <a:avLst/>
+          </a:prstGeom>
+          <a:noFill/>
+        </p:spPr>
+        <p:txBody>
+          <a:bodyPr vert="horz" wrap="square" lIns="121899" tIns="60949" rIns="121899" bIns="60949" rtlCol="0">
+            <a:spAutoFit/>
+          </a:bodyPr>
+          <a:lstStyle>
+            <a:lvl1pPr marL="304747" indent="-304747" algn="l" defTabSz="1218987" rtl="0" eaLnBrk="1" latinLnBrk="0" hangingPunct="1">
+              <a:lnSpc>
+                <a:spcPct val="95000"/>
+              </a:lnSpc>
+              <a:spcBef>
+                <a:spcPts val="1866"/>
+              </a:spcBef>
+              <a:buSzPct val="100000"/>
+              <a:buFont typeface="Arial" pitchFamily="34" charset="0"/>
+              <a:buChar char="•"/>
+              <a:defRPr sz="2400" kern="1200">
+                <a:solidFill>
+                  <a:schemeClr val="tx1"/>
+                </a:solidFill>
+                <a:latin typeface="+mn-lt"/>
+                <a:ea typeface="+mn-ea"/>
+                <a:cs typeface="+mn-cs"/>
+              </a:defRPr>
+            </a:lvl1pPr>
+            <a:lvl2pPr marL="731392" indent="-304747" algn="l" defTabSz="1218987" rtl="0" eaLnBrk="1" latinLnBrk="0" hangingPunct="1">
+              <a:lnSpc>
+                <a:spcPct val="95000"/>
+              </a:lnSpc>
+              <a:spcBef>
+                <a:spcPts val="1066"/>
+              </a:spcBef>
+              <a:buSzPct val="100000"/>
+              <a:buFont typeface="Century Gothic" pitchFamily="34" charset="0"/>
+              <a:buChar char="–"/>
+              <a:defRPr sz="2000" kern="1200">
+                <a:solidFill>
+                  <a:schemeClr val="tx1"/>
+                </a:solidFill>
+                <a:latin typeface="+mn-lt"/>
+                <a:ea typeface="+mn-ea"/>
+                <a:cs typeface="+mn-cs"/>
+              </a:defRPr>
+            </a:lvl2pPr>
+            <a:lvl3pPr marL="1158037" indent="-304747" algn="l" defTabSz="1218987" rtl="0" eaLnBrk="1" latinLnBrk="0" hangingPunct="1">
+              <a:lnSpc>
+                <a:spcPct val="95000"/>
+              </a:lnSpc>
+              <a:spcBef>
+                <a:spcPts val="1066"/>
+              </a:spcBef>
+              <a:buSzPct val="100000"/>
+              <a:buFont typeface="Century Gothic" pitchFamily="34" charset="0"/>
+              <a:buChar char="–"/>
+              <a:defRPr sz="1800" kern="1200">
+                <a:solidFill>
+                  <a:schemeClr val="tx1"/>
+                </a:solidFill>
+                <a:latin typeface="+mn-lt"/>
+                <a:ea typeface="+mn-ea"/>
+                <a:cs typeface="+mn-cs"/>
+              </a:defRPr>
+            </a:lvl3pPr>
+            <a:lvl4pPr marL="1584683" indent="-304747" algn="l" defTabSz="1218987" rtl="0" eaLnBrk="1" latinLnBrk="0" hangingPunct="1">
+              <a:lnSpc>
+                <a:spcPct val="95000"/>
+              </a:lnSpc>
+              <a:spcBef>
+                <a:spcPts val="1066"/>
+              </a:spcBef>
+              <a:buSzPct val="100000"/>
+              <a:buFont typeface="Century Gothic" pitchFamily="34" charset="0"/>
+              <a:buChar char="–"/>
+              <a:defRPr sz="1800" kern="1200">
+                <a:solidFill>
+                  <a:schemeClr val="tx1"/>
+                </a:solidFill>
+                <a:latin typeface="+mn-lt"/>
+                <a:ea typeface="+mn-ea"/>
+                <a:cs typeface="+mn-cs"/>
+              </a:defRPr>
+            </a:lvl4pPr>
+            <a:lvl5pPr marL="2011328" indent="-304747" algn="l" defTabSz="1218987" rtl="0" eaLnBrk="1" latinLnBrk="0" hangingPunct="1">
+              <a:lnSpc>
+                <a:spcPct val="95000"/>
+              </a:lnSpc>
+              <a:spcBef>
+                <a:spcPts val="1066"/>
+              </a:spcBef>
+              <a:buSzPct val="100000"/>
+              <a:buFont typeface="Century Gothic" pitchFamily="34" charset="0"/>
+              <a:buChar char="–"/>
+              <a:defRPr sz="1800" kern="1200">
+                <a:solidFill>
+                  <a:schemeClr val="tx1"/>
+                </a:solidFill>
+                <a:latin typeface="+mn-lt"/>
+                <a:ea typeface="+mn-ea"/>
+                <a:cs typeface="+mn-cs"/>
+              </a:defRPr>
+            </a:lvl5pPr>
+            <a:lvl6pPr marL="2437973" indent="-304747" algn="l" defTabSz="1218987" rtl="0" eaLnBrk="1" latinLnBrk="0" hangingPunct="1">
+              <a:lnSpc>
+                <a:spcPct val="95000"/>
+              </a:lnSpc>
+              <a:spcBef>
+                <a:spcPts val="1066"/>
+              </a:spcBef>
+              <a:buSzPct val="90000"/>
+              <a:buFont typeface="Century Gothic" pitchFamily="34" charset="0"/>
+              <a:buChar char="–"/>
+              <a:defRPr sz="1800" kern="1200">
+                <a:solidFill>
+                  <a:schemeClr val="tx1"/>
+                </a:solidFill>
+                <a:latin typeface="+mn-lt"/>
+                <a:ea typeface="+mn-ea"/>
+                <a:cs typeface="+mn-cs"/>
+              </a:defRPr>
+            </a:lvl6pPr>
+            <a:lvl7pPr marL="2864619" indent="-304747" algn="l" defTabSz="1218987" rtl="0" eaLnBrk="1" latinLnBrk="0" hangingPunct="1">
+              <a:lnSpc>
+                <a:spcPct val="95000"/>
+              </a:lnSpc>
+              <a:spcBef>
+                <a:spcPts val="1066"/>
+              </a:spcBef>
+              <a:buSzPct val="90000"/>
+              <a:buFont typeface="Century Gothic" pitchFamily="34" charset="0"/>
+              <a:buChar char="–"/>
+              <a:defRPr sz="1800" kern="1200" baseline="0">
+                <a:solidFill>
+                  <a:schemeClr val="tx1"/>
+                </a:solidFill>
+                <a:latin typeface="+mn-lt"/>
+                <a:ea typeface="+mn-ea"/>
+                <a:cs typeface="+mn-cs"/>
+              </a:defRPr>
+            </a:lvl7pPr>
+            <a:lvl8pPr marL="3291264" indent="-304747" algn="l" defTabSz="1218987" rtl="0" eaLnBrk="1" latinLnBrk="0" hangingPunct="1">
+              <a:lnSpc>
+                <a:spcPct val="95000"/>
+              </a:lnSpc>
+              <a:spcBef>
+                <a:spcPts val="1066"/>
+              </a:spcBef>
+              <a:buSzPct val="90000"/>
+              <a:buFont typeface="Century Gothic" pitchFamily="34" charset="0"/>
+              <a:buChar char="–"/>
+              <a:defRPr sz="1800" kern="1200" baseline="0">
+                <a:solidFill>
+                  <a:schemeClr val="tx1"/>
+                </a:solidFill>
+                <a:latin typeface="+mn-lt"/>
+                <a:ea typeface="+mn-ea"/>
+                <a:cs typeface="+mn-cs"/>
+              </a:defRPr>
+            </a:lvl8pPr>
+            <a:lvl9pPr marL="3778859" indent="-304747" algn="l" defTabSz="1218987" rtl="0" eaLnBrk="1" latinLnBrk="0" hangingPunct="1">
+              <a:lnSpc>
+                <a:spcPct val="95000"/>
+              </a:lnSpc>
+              <a:spcBef>
+                <a:spcPts val="1066"/>
+              </a:spcBef>
+              <a:buSzPct val="90000"/>
+              <a:buFont typeface="Century Gothic" pitchFamily="34" charset="0"/>
+              <a:buChar char="–"/>
+              <a:defRPr sz="1800" kern="1200" baseline="0">
+                <a:solidFill>
+                  <a:schemeClr val="tx1"/>
+                </a:solidFill>
+                <a:latin typeface="+mn-lt"/>
+                <a:ea typeface="+mn-ea"/>
+                <a:cs typeface="+mn-cs"/>
+              </a:defRPr>
+            </a:lvl9pPr>
+          </a:lstStyle>
+          <a:p>
+            <a:pPr marL="0" indent="0">
+              <a:buNone/>
+            </a:pPr>
+            <a:r>
+              <a:rPr lang="en-US" sz="1800" dirty="0"/>
+              <a:t>The Free Calculator simplifies your life and multiplies your opportunities. For work &amp; school at home. A basic calculator and a scientific mode for more extensive math. The Free Calculator simplifies your life and multiplies your opportunities!</a:t>
+            </a:r>
+            <a:endParaRPr lang="en-US" sz="1800" dirty="0"/>
           </a:p>
         </p:txBody>
       </p:sp>
@@ -4403,40 +4707,182 @@
           </a:p>
         </p:txBody>
       </p:sp>
-      <p:sp>
-        <p:nvSpPr>
-          <p:cNvPr id="3" name="Content Placeholder 2"/>
-          <p:cNvSpPr>
-            <a:spLocks noGrp="1"/>
-          </p:cNvSpPr>
-          <p:nvPr>
-            <p:ph sz="half" idx="1"/>
-          </p:nvPr>
-        </p:nvSpPr>
-        <p:spPr/>
-        <p:txBody>
-          <a:bodyPr/>
+      <p:pic>
+        <p:nvPicPr>
+          <p:cNvPr id="4" name="Picture 3"/>
+          <p:cNvPicPr>
+            <a:picLocks noChangeAspect="1"/>
+          </p:cNvPicPr>
+          <p:nvPr/>
+        </p:nvPicPr>
+        <p:blipFill>
+          <a:blip r:embed="rId2">
+            <a:extLst>
+              <a:ext uri="{28A0092B-C50C-407E-A947-70E740481C1C}">
+                <a14:useLocalDpi xmlns:a14="http://schemas.microsoft.com/office/drawing/2010/main" val="0"/>
+              </a:ext>
+            </a:extLst>
+          </a:blip>
+          <a:stretch>
+            <a:fillRect/>
+          </a:stretch>
+        </p:blipFill>
+        <p:spPr>
+          <a:xfrm>
+            <a:off x="3351212" y="1600200"/>
+            <a:ext cx="3567284" cy="1999247"/>
+          </a:xfrm>
+          <a:prstGeom prst="rect">
+            <a:avLst/>
+          </a:prstGeom>
+        </p:spPr>
+      </p:pic>
+      <p:pic>
+        <p:nvPicPr>
+          <p:cNvPr id="6" name="Picture 5"/>
+          <p:cNvPicPr>
+            <a:picLocks noChangeAspect="1"/>
+          </p:cNvPicPr>
+          <p:nvPr/>
+        </p:nvPicPr>
+        <p:blipFill>
+          <a:blip r:embed="rId3">
+            <a:extLst>
+              <a:ext uri="{28A0092B-C50C-407E-A947-70E740481C1C}">
+                <a14:useLocalDpi xmlns:a14="http://schemas.microsoft.com/office/drawing/2010/main" val="0"/>
+              </a:ext>
+            </a:extLst>
+          </a:blip>
+          <a:stretch>
+            <a:fillRect/>
+          </a:stretch>
+        </p:blipFill>
+        <p:spPr>
+          <a:xfrm>
+            <a:off x="5515406" y="4454610"/>
+            <a:ext cx="3657600" cy="2054888"/>
+          </a:xfrm>
+          <a:prstGeom prst="rect">
+            <a:avLst/>
+          </a:prstGeom>
+        </p:spPr>
+      </p:pic>
+      <p:pic>
+        <p:nvPicPr>
+          <p:cNvPr id="7" name="Picture 6"/>
+          <p:cNvPicPr>
+            <a:picLocks noChangeAspect="1"/>
+          </p:cNvPicPr>
+          <p:nvPr/>
+        </p:nvPicPr>
+        <p:blipFill>
+          <a:blip r:embed="rId4">
+            <a:extLst>
+              <a:ext uri="{28A0092B-C50C-407E-A947-70E740481C1C}">
+                <a14:useLocalDpi xmlns:a14="http://schemas.microsoft.com/office/drawing/2010/main" val="0"/>
+              </a:ext>
+            </a:extLst>
+          </a:blip>
+          <a:stretch>
+            <a:fillRect/>
+          </a:stretch>
+        </p:blipFill>
+        <p:spPr>
+          <a:xfrm>
+            <a:off x="887781" y="1600200"/>
+            <a:ext cx="2320065" cy="4119562"/>
+          </a:xfrm>
+          <a:prstGeom prst="rect">
+            <a:avLst/>
+          </a:prstGeom>
+        </p:spPr>
+      </p:pic>
+      <p:pic>
+        <p:nvPicPr>
+          <p:cNvPr id="8" name="Picture 7"/>
+          <p:cNvPicPr>
+            <a:picLocks noChangeAspect="1"/>
+          </p:cNvPicPr>
+          <p:nvPr/>
+        </p:nvPicPr>
+        <p:blipFill>
+          <a:blip r:embed="rId5">
+            <a:extLst>
+              <a:ext uri="{28A0092B-C50C-407E-A947-70E740481C1C}">
+                <a14:useLocalDpi xmlns:a14="http://schemas.microsoft.com/office/drawing/2010/main" val="0"/>
+              </a:ext>
+            </a:extLst>
+          </a:blip>
+          <a:stretch>
+            <a:fillRect/>
+          </a:stretch>
+        </p:blipFill>
+        <p:spPr>
+          <a:xfrm>
+            <a:off x="9226851" y="2350807"/>
+            <a:ext cx="2319188" cy="4152513"/>
+          </a:xfrm>
+          <a:prstGeom prst="rect">
+            <a:avLst/>
+          </a:prstGeom>
+        </p:spPr>
+      </p:pic>
+      <p:sp>
+        <p:nvSpPr>
+          <p:cNvPr id="9" name="TextBox 8"/>
+          <p:cNvSpPr txBox="1"/>
+          <p:nvPr/>
+        </p:nvSpPr>
+        <p:spPr>
+          <a:xfrm>
+            <a:off x="3351212" y="3659981"/>
+            <a:ext cx="2590800" cy="461665"/>
+          </a:xfrm>
+          <a:prstGeom prst="rect">
+            <a:avLst/>
+          </a:prstGeom>
+          <a:noFill/>
+        </p:spPr>
+        <p:txBody>
+          <a:bodyPr wrap="square" rtlCol="0">
+            <a:spAutoFit/>
+          </a:bodyPr>
           <a:lstStyle/>
           <a:p>
-            <a:endParaRPr lang="en-US"/>
-          </a:p>
-        </p:txBody>
-      </p:sp>
-      <p:sp>
-        <p:nvSpPr>
-          <p:cNvPr id="5" name="Content Placeholder 4"/>
-          <p:cNvSpPr>
-            <a:spLocks noGrp="1"/>
-          </p:cNvSpPr>
-          <p:nvPr>
-            <p:ph sz="half" idx="2"/>
-          </p:nvPr>
-        </p:nvSpPr>
-        <p:spPr/>
-        <p:txBody>
-          <a:bodyPr/>
+            <a:r>
+              <a:rPr lang="en-US" altLang="zh-CN" dirty="0" smtClean="0"/>
+              <a:t>Day Mode</a:t>
+            </a:r>
+            <a:endParaRPr lang="en-US" dirty="0"/>
+          </a:p>
+        </p:txBody>
+      </p:sp>
+      <p:sp>
+        <p:nvSpPr>
+          <p:cNvPr id="10" name="TextBox 9"/>
+          <p:cNvSpPr txBox="1"/>
+          <p:nvPr/>
+        </p:nvSpPr>
+        <p:spPr>
+          <a:xfrm>
+            <a:off x="7008812" y="3890813"/>
+            <a:ext cx="2164194" cy="461665"/>
+          </a:xfrm>
+          <a:prstGeom prst="rect">
+            <a:avLst/>
+          </a:prstGeom>
+          <a:noFill/>
+        </p:spPr>
+        <p:txBody>
+          <a:bodyPr wrap="square" rtlCol="0">
+            <a:spAutoFit/>
+          </a:bodyPr>
           <a:lstStyle/>
           <a:p>
+            <a:r>
+              <a:rPr lang="en-US" dirty="0" smtClean="0"/>
+              <a:t>Night Mode</a:t>
+            </a:r>
             <a:endParaRPr lang="en-US" dirty="0"/>
           </a:p>
         </p:txBody>
@@ -4518,44 +4964,74 @@
         </p:nvSpPr>
         <p:spPr/>
         <p:txBody>
-          <a:bodyPr/>
+          <a:bodyPr>
+            <a:normAutofit fontScale="55000" lnSpcReduction="20000"/>
+          </a:bodyPr>
           <a:lstStyle/>
           <a:p>
             <a:r>
               <a:rPr lang="en-US" dirty="0"/>
-              <a:t>First bullet point here</a:t>
+              <a:t>Addition, Subtraction, Division, Multiplication, Percentages</a:t>
             </a:r>
           </a:p>
           <a:p>
             <a:r>
               <a:rPr lang="en-US" dirty="0"/>
-              <a:t>Second bullet point here</a:t>
+              <a:t>Square, Cubic Exponent, Nth Exponent</a:t>
             </a:r>
           </a:p>
           <a:p>
             <a:r>
               <a:rPr lang="en-US" dirty="0"/>
-              <a:t>Third bullet point here</a:t>
-            </a:r>
-          </a:p>
-        </p:txBody>
-      </p:sp>
-      <p:sp>
-        <p:nvSpPr>
-          <p:cNvPr id="3" name="Content Placeholder 2"/>
-          <p:cNvSpPr>
-            <a:spLocks noGrp="1"/>
-          </p:cNvSpPr>
-          <p:nvPr>
-            <p:ph sz="half" idx="2"/>
-          </p:nvPr>
-        </p:nvSpPr>
-        <p:spPr/>
-        <p:txBody>
-          <a:bodyPr/>
-          <a:lstStyle/>
-          <a:p>
-            <a:endParaRPr lang="en-US" dirty="0"/>
+              <a:t>Square Root, Cubic Root, Nth Root</a:t>
+            </a:r>
+          </a:p>
+          <a:p>
+            <a:r>
+              <a:rPr lang="en-US" dirty="0"/>
+              <a:t>Engineering Exponent, Factorial</a:t>
+            </a:r>
+          </a:p>
+          <a:p>
+            <a:r>
+              <a:rPr lang="en-US" dirty="0"/>
+              <a:t>Power of Two, Power of Ten, Power of E</a:t>
+            </a:r>
+          </a:p>
+          <a:p>
+            <a:r>
+              <a:rPr lang="en-US" dirty="0"/>
+              <a:t>Natural Logarithm, Common Logarithm, Binary Logarithm</a:t>
+            </a:r>
+          </a:p>
+          <a:p>
+            <a:r>
+              <a:rPr lang="en-US" dirty="0"/>
+              <a:t>Sine, Cosine, Tangent</a:t>
+            </a:r>
+          </a:p>
+          <a:p>
+            <a:r>
+              <a:rPr lang="en-US" dirty="0"/>
+              <a:t>Arc Sine, Arc Cosine, Arc </a:t>
+            </a:r>
+            <a:r>
+              <a:rPr lang="en-US" dirty="0" smtClean="0"/>
+              <a:t>Tangent</a:t>
+            </a:r>
+          </a:p>
+          <a:p>
+            <a:r>
+              <a:rPr lang="en-US" dirty="0" smtClean="0"/>
+              <a:t>Hyperbolic Sine, Hyperbolic Cosine, Hyperbolic Tangent</a:t>
+            </a:r>
+          </a:p>
+          <a:p>
+            <a:r>
+              <a:rPr lang="en-US" dirty="0" smtClean="0"/>
+              <a:t>Hyperbolic Arc Sine, Hyperbolic Arc Cosine, Hyperbolic Arc Tangent</a:t>
+            </a:r>
+            <a:endParaRPr lang="en-US" b="1" dirty="0"/>
           </a:p>
         </p:txBody>
       </p:sp>
@@ -4563,147 +5039,6 @@
     <p:extLst>
       <p:ext uri="{BB962C8B-B14F-4D97-AF65-F5344CB8AC3E}">
         <p14:creationId xmlns:p14="http://schemas.microsoft.com/office/powerpoint/2010/main" val="6860444"/>
-      </p:ext>
-    </p:extLst>
-  </p:cSld>
-  <p:clrMapOvr>
-    <a:masterClrMapping/>
-  </p:clrMapOvr>
-  <mc:AlternateContent xmlns:mc="http://schemas.openxmlformats.org/markup-compatibility/2006" xmlns:p14="http://schemas.microsoft.com/office/powerpoint/2010/main">
-    <mc:Choice Requires="p14">
-      <p:transition spd="med" p14:dur="700">
-        <p:fade/>
-      </p:transition>
-    </mc:Choice>
-    <mc:Fallback xmlns="">
-      <p:transition spd="med">
-        <p:fade/>
-      </p:transition>
-    </mc:Fallback>
-  </mc:AlternateContent>
-</p:sld>
-</file>
-
-<file path=ppt/slides/slide6.xml><?xml version="1.0" encoding="utf-8"?>
-<p:sld xmlns:a="http://schemas.openxmlformats.org/drawingml/2006/main" xmlns:r="http://schemas.openxmlformats.org/officeDocument/2006/relationships" xmlns:p="http://schemas.openxmlformats.org/presentationml/2006/main">
-  <p:cSld>
-    <p:spTree>
-      <p:nvGrpSpPr>
-        <p:cNvPr id="1" name=""/>
-        <p:cNvGrpSpPr/>
-        <p:nvPr/>
-      </p:nvGrpSpPr>
-      <p:grpSpPr>
-        <a:xfrm>
-          <a:off x="0" y="0"/>
-          <a:ext cx="0" cy="0"/>
-          <a:chOff x="0" y="0"/>
-          <a:chExt cx="0" cy="0"/>
-        </a:xfrm>
-      </p:grpSpPr>
-      <p:sp>
-        <p:nvSpPr>
-          <p:cNvPr id="2" name="Title 1"/>
-          <p:cNvSpPr>
-            <a:spLocks noGrp="1"/>
-          </p:cNvSpPr>
-          <p:nvPr>
-            <p:ph type="title"/>
-          </p:nvPr>
-        </p:nvSpPr>
-        <p:spPr/>
-        <p:txBody>
-          <a:bodyPr/>
-          <a:lstStyle/>
-          <a:p>
-            <a:r>
-              <a:rPr lang="en-US" dirty="0" smtClean="0"/>
-              <a:t>Members 'contribution</a:t>
-            </a:r>
-            <a:endParaRPr lang="en-US" dirty="0"/>
-          </a:p>
-        </p:txBody>
-      </p:sp>
-      <p:sp>
-        <p:nvSpPr>
-          <p:cNvPr id="5" name="Text Placeholder 4"/>
-          <p:cNvSpPr>
-            <a:spLocks noGrp="1"/>
-          </p:cNvSpPr>
-          <p:nvPr>
-            <p:ph type="body" idx="1"/>
-          </p:nvPr>
-        </p:nvSpPr>
-        <p:spPr/>
-        <p:txBody>
-          <a:bodyPr/>
-          <a:lstStyle/>
-          <a:p>
-            <a:endParaRPr lang="en-US" dirty="0"/>
-          </a:p>
-        </p:txBody>
-      </p:sp>
-      <p:sp>
-        <p:nvSpPr>
-          <p:cNvPr id="3" name="Content Placeholder 2"/>
-          <p:cNvSpPr>
-            <a:spLocks noGrp="1"/>
-          </p:cNvSpPr>
-          <p:nvPr>
-            <p:ph sz="half" idx="2"/>
-          </p:nvPr>
-        </p:nvSpPr>
-        <p:spPr/>
-        <p:txBody>
-          <a:bodyPr/>
-          <a:lstStyle/>
-          <a:p>
-            <a:endParaRPr lang="en-US" dirty="0"/>
-          </a:p>
-        </p:txBody>
-      </p:sp>
-      <p:sp>
-        <p:nvSpPr>
-          <p:cNvPr id="6" name="Text Placeholder 5"/>
-          <p:cNvSpPr>
-            <a:spLocks noGrp="1"/>
-          </p:cNvSpPr>
-          <p:nvPr>
-            <p:ph type="body" sz="quarter" idx="3"/>
-          </p:nvPr>
-        </p:nvSpPr>
-        <p:spPr/>
-        <p:txBody>
-          <a:bodyPr/>
-          <a:lstStyle/>
-          <a:p>
-            <a:endParaRPr lang="en-US" dirty="0"/>
-          </a:p>
-        </p:txBody>
-      </p:sp>
-      <p:sp>
-        <p:nvSpPr>
-          <p:cNvPr id="4" name="Content Placeholder 3"/>
-          <p:cNvSpPr>
-            <a:spLocks noGrp="1"/>
-          </p:cNvSpPr>
-          <p:nvPr>
-            <p:ph sz="quarter" idx="4"/>
-          </p:nvPr>
-        </p:nvSpPr>
-        <p:spPr/>
-        <p:txBody>
-          <a:bodyPr/>
-          <a:lstStyle/>
-          <a:p>
-            <a:endParaRPr lang="en-US" dirty="0"/>
-          </a:p>
-        </p:txBody>
-      </p:sp>
-    </p:spTree>
-    <p:extLst>
-      <p:ext uri="{BB962C8B-B14F-4D97-AF65-F5344CB8AC3E}">
-        <p14:creationId xmlns:p14="http://schemas.microsoft.com/office/powerpoint/2010/main" val="3296948863"/>
       </p:ext>
     </p:extLst>
   </p:cSld>

</xml_diff>